<commit_message>
Fixed some typos in powerpoint
</commit_message>
<xml_diff>
--- a/powerpoint/biogeobears_tutorial_20170515.pptx
+++ b/powerpoint/biogeobears_tutorial_20170515.pptx
@@ -3880,12 +3880,12 @@
           <a:lstStyle/>
           <a:p>
             <a:r>
+              <a:rPr lang="en-US" dirty="0" smtClean="0"/>
+              <a:t>Tutorial </a:t>
+            </a:r>
+            <a:r>
               <a:rPr lang="en-US" dirty="0" err="1" smtClean="0"/>
               <a:t>BioGeoBears</a:t>
-            </a:r>
-            <a:r>
-              <a:rPr lang="en-US" dirty="0" smtClean="0"/>
-              <a:t> Tutorial</a:t>
             </a:r>
             <a:endParaRPr lang="en-US" dirty="0"/>
           </a:p>
@@ -4012,11 +4012,7 @@
             </a:r>
             <a:r>
               <a:rPr lang="en-US" dirty="0" smtClean="0"/>
-              <a:t> </a:t>
-            </a:r>
-            <a:r>
-              <a:rPr lang="en-US" dirty="0" smtClean="0"/>
-              <a:t>entre los </a:t>
+              <a:t> entre los </a:t>
             </a:r>
             <a:r>
               <a:rPr lang="en-US" dirty="0" err="1" smtClean="0"/>
@@ -4036,11 +4032,7 @@
             </a:r>
             <a:r>
               <a:rPr lang="en-US" dirty="0" err="1" smtClean="0"/>
-              <a:t>opci</a:t>
-            </a:r>
-            <a:r>
-              <a:rPr lang="en-US" dirty="0" err="1" smtClean="0"/>
-              <a:t>ón</a:t>
+              <a:t>opción</a:t>
             </a:r>
             <a:r>
               <a:rPr lang="en-US" dirty="0" smtClean="0"/>
@@ -4818,11 +4810,7 @@
             </a:r>
             <a:r>
               <a:rPr lang="en-US" dirty="0" err="1" smtClean="0"/>
-              <a:t>est</a:t>
-            </a:r>
-            <a:r>
-              <a:rPr lang="en-US" dirty="0" err="1" smtClean="0"/>
-              <a:t>á</a:t>
+              <a:t>está</a:t>
             </a:r>
             <a:r>
               <a:rPr lang="en-US" dirty="0" smtClean="0"/>
@@ -21423,11 +21411,7 @@
           <a:p>
             <a:r>
               <a:rPr lang="en-US" dirty="0" err="1" smtClean="0"/>
-              <a:t>M</a:t>
-            </a:r>
-            <a:r>
-              <a:rPr lang="en-US" dirty="0" err="1" smtClean="0"/>
-              <a:t>atriz</a:t>
+              <a:t>Matriz</a:t>
             </a:r>
             <a:r>
               <a:rPr lang="en-US" dirty="0" smtClean="0"/>
@@ -21763,11 +21747,7 @@
             </a:r>
             <a:r>
               <a:rPr lang="en-US" sz="3000" dirty="0" err="1" smtClean="0"/>
-              <a:t>cladogen</a:t>
-            </a:r>
-            <a:r>
-              <a:rPr lang="en-US" sz="3000" dirty="0" err="1" smtClean="0"/>
-              <a:t>ético</a:t>
+              <a:t>cladogenético</a:t>
             </a:r>
             <a:endParaRPr lang="en-US" sz="3000" dirty="0"/>
           </a:p>
@@ -21923,7 +21903,6 @@
               <a:rPr lang="en-US" sz="4000" b="1" baseline="30000" dirty="0" smtClean="0"/>
               <a:t>1:</a:t>
             </a:r>
-            <a:endParaRPr lang="en-US" sz="4000" b="1" baseline="30000" dirty="0" smtClean="0"/>
           </a:p>
           <a:p>
             <a:pPr algn="ctr"/>
@@ -22021,7 +22000,6 @@
               <a:rPr lang="en-US" sz="4000" b="1" baseline="30000" dirty="0" smtClean="0"/>
               <a:t>2:</a:t>
             </a:r>
-            <a:endParaRPr lang="en-US" sz="4000" b="1" baseline="30000" dirty="0" smtClean="0"/>
           </a:p>
           <a:p>
             <a:pPr algn="ctr"/>
@@ -22112,7 +22090,6 @@
               <a:rPr lang="en-US" sz="4000" b="1" baseline="30000" dirty="0" smtClean="0"/>
               <a:t>3:</a:t>
             </a:r>
-            <a:endParaRPr lang="en-US" sz="4000" b="1" baseline="30000" dirty="0" smtClean="0"/>
           </a:p>
           <a:p>
             <a:endParaRPr lang="en-US" sz="4000" b="1" baseline="30000" dirty="0"/>
@@ -22306,7 +22283,7 @@
             </a:r>
             <a:r>
               <a:rPr lang="en-US" dirty="0" err="1" smtClean="0"/>
-              <a:t>distinctos</a:t>
+              <a:t>distintos</a:t>
             </a:r>
             <a:r>
               <a:rPr lang="en-US" dirty="0" smtClean="0"/>

</xml_diff>